<commit_message>
Updated slides with AWS19 icons.
</commit_message>
<xml_diff>
--- a/slides/chapter05.pptx
+++ b/slides/chapter05.pptx
@@ -323,6 +323,11 @@
       </a:defRPr>
     </a:lvl9pPr>
   </p:defaultTextStyle>
+  <p:extLst>
+    <p:ext uri="{EFAFB233-063F-42B5-8137-9DF3F51BA10A}">
+      <p15:sldGuideLst xmlns:p15="http://schemas.microsoft.com/office/powerpoint/2012/main"/>
+    </p:ext>
+  </p:extLst>
 </p:presentation>
 </file>
 
@@ -2164,7 +2169,7 @@
           </a:ln>
           <a:extLst>
             <a:ext uri="{C572A759-6A51-4108-AA02-DFA0A04FC94B}">
-              <ma14:wrappingTextBoxFlag xmlns:ma14="http://schemas.microsoft.com/office/mac/drawingml/2011/main" xmlns:a14="http://schemas.microsoft.com/office/drawing/2010/main" xmlns:m="http://schemas.openxmlformats.org/officeDocument/2006/math" xmlns="" val="1"/>
+              <ma14:wrappingTextBoxFlag xmlns="" xmlns:m="http://schemas.openxmlformats.org/officeDocument/2006/math" xmlns:a14="http://schemas.microsoft.com/office/drawing/2010/main" xmlns:ma14="http://schemas.microsoft.com/office/mac/drawingml/2011/main" val="1"/>
             </a:ext>
           </a:extLst>
         </p:spPr>
@@ -2203,7 +2208,7 @@
           </a:ln>
           <a:extLst>
             <a:ext uri="{C572A759-6A51-4108-AA02-DFA0A04FC94B}">
-              <ma14:wrappingTextBoxFlag xmlns:ma14="http://schemas.microsoft.com/office/mac/drawingml/2011/main" xmlns:a14="http://schemas.microsoft.com/office/drawing/2010/main" xmlns:m="http://schemas.openxmlformats.org/officeDocument/2006/math" xmlns="" val="1"/>
+              <ma14:wrappingTextBoxFlag xmlns="" xmlns:m="http://schemas.openxmlformats.org/officeDocument/2006/math" xmlns:a14="http://schemas.microsoft.com/office/drawing/2010/main" xmlns:ma14="http://schemas.microsoft.com/office/mac/drawingml/2011/main" val="1"/>
             </a:ext>
           </a:extLst>
         </p:spPr>
@@ -3162,7 +3167,7 @@
           </a:ln>
           <a:extLst>
             <a:ext uri="{C572A759-6A51-4108-AA02-DFA0A04FC94B}">
-              <ma14:wrappingTextBoxFlag xmlns:ma14="http://schemas.microsoft.com/office/mac/drawingml/2011/main" xmlns:a14="http://schemas.microsoft.com/office/drawing/2010/main" xmlns:m="http://schemas.openxmlformats.org/officeDocument/2006/math" xmlns="" val="1"/>
+              <ma14:wrappingTextBoxFlag xmlns="" xmlns:m="http://schemas.openxmlformats.org/officeDocument/2006/math" xmlns:a14="http://schemas.microsoft.com/office/drawing/2010/main" xmlns:ma14="http://schemas.microsoft.com/office/mac/drawingml/2011/main" val="1"/>
             </a:ext>
           </a:extLst>
         </p:spPr>
@@ -3554,7 +3559,9 @@
           </a:prstGeom>
         </p:spPr>
         <p:txBody>
-          <a:bodyPr/>
+          <a:bodyPr>
+            <a:normAutofit fontScale="90000"/>
+          </a:bodyPr>
           <a:lstStyle>
             <a:lvl1pPr defTabSz="808990">
               <a:defRPr sz="8232"/>
@@ -3647,29 +3654,38 @@
       </p:sp>
       <p:pic>
         <p:nvPicPr>
-          <p:cNvPr id="153" name="Cloud Native-ECS - AWS Setup.png" descr="Cloud Native-ECS - AWS Setup.png"/>
+          <p:cNvPr id="3" name="Picture 2">
+            <a:extLst>
+              <a:ext uri="{FF2B5EF4-FFF2-40B4-BE49-F238E27FC236}">
+                <a16:creationId xmlns:a16="http://schemas.microsoft.com/office/drawing/2014/main" id="{BF50A01B-221A-9244-9C8D-5AEB9264BC4F}"/>
+              </a:ext>
+            </a:extLst>
+          </p:cNvPr>
           <p:cNvPicPr>
             <a:picLocks noChangeAspect="1"/>
           </p:cNvPicPr>
           <p:nvPr/>
         </p:nvPicPr>
         <p:blipFill>
-          <a:blip r:embed="rId2"/>
+          <a:blip r:embed="rId2">
+            <a:extLst>
+              <a:ext uri="{28A0092B-C50C-407E-A947-70E740481C1C}">
+                <a14:useLocalDpi xmlns:a14="http://schemas.microsoft.com/office/drawing/2010/main" val="0"/>
+              </a:ext>
+            </a:extLst>
+          </a:blip>
           <a:stretch>
             <a:fillRect/>
           </a:stretch>
         </p:blipFill>
         <p:spPr>
           <a:xfrm>
-            <a:off x="6916002" y="2946839"/>
-            <a:ext cx="10551996" cy="9701922"/>
+            <a:off x="5587060" y="3322084"/>
+            <a:ext cx="13209879" cy="9701922"/>
           </a:xfrm>
           <a:prstGeom prst="rect">
             <a:avLst/>
           </a:prstGeom>
-          <a:ln w="12700">
-            <a:miter lim="400000"/>
-          </a:ln>
         </p:spPr>
       </p:pic>
     </p:spTree>
@@ -3792,7 +3808,9 @@
           </a:prstGeom>
         </p:spPr>
         <p:txBody>
-          <a:bodyPr/>
+          <a:bodyPr>
+            <a:normAutofit fontScale="90000"/>
+          </a:bodyPr>
           <a:lstStyle>
             <a:lvl1pPr defTabSz="792479">
               <a:defRPr sz="10752"/>
@@ -3807,29 +3825,38 @@
       </p:sp>
       <p:pic>
         <p:nvPicPr>
-          <p:cNvPr id="159" name="Cloud Native-ECS service task.png" descr="Cloud Native-ECS service task.png"/>
+          <p:cNvPr id="3" name="Picture 2">
+            <a:extLst>
+              <a:ext uri="{FF2B5EF4-FFF2-40B4-BE49-F238E27FC236}">
+                <a16:creationId xmlns:a16="http://schemas.microsoft.com/office/drawing/2014/main" id="{51DC87DF-5E3C-D548-B91C-8961834BA517}"/>
+              </a:ext>
+            </a:extLst>
+          </p:cNvPr>
           <p:cNvPicPr>
             <a:picLocks noChangeAspect="1"/>
           </p:cNvPicPr>
           <p:nvPr/>
         </p:nvPicPr>
         <p:blipFill>
-          <a:blip r:embed="rId2"/>
+          <a:blip r:embed="rId2">
+            <a:extLst>
+              <a:ext uri="{28A0092B-C50C-407E-A947-70E740481C1C}">
+                <a14:useLocalDpi xmlns:a14="http://schemas.microsoft.com/office/drawing/2010/main" val="0"/>
+              </a:ext>
+            </a:extLst>
+          </a:blip>
           <a:stretch>
             <a:fillRect/>
           </a:stretch>
         </p:blipFill>
         <p:spPr>
           <a:xfrm>
-            <a:off x="4064000" y="4165600"/>
-            <a:ext cx="16256000" cy="7264400"/>
+            <a:off x="4131712" y="3998284"/>
+            <a:ext cx="16120576" cy="7506143"/>
           </a:xfrm>
           <a:prstGeom prst="rect">
             <a:avLst/>
           </a:prstGeom>
-          <a:ln w="12700">
-            <a:miter lim="400000"/>
-          </a:ln>
         </p:spPr>
       </p:pic>
     </p:spTree>
@@ -4191,7 +4218,9 @@
           </a:prstGeom>
         </p:spPr>
         <p:txBody>
-          <a:bodyPr/>
+          <a:bodyPr>
+            <a:normAutofit fontScale="90000"/>
+          </a:bodyPr>
           <a:lstStyle>
             <a:lvl1pPr defTabSz="726440">
               <a:defRPr sz="9856"/>
@@ -4206,29 +4235,38 @@
       </p:sp>
       <p:pic>
         <p:nvPicPr>
-          <p:cNvPr id="135" name="Cloud Native-ECS - region AZs.png" descr="Cloud Native-ECS - region AZs.png"/>
+          <p:cNvPr id="5" name="Picture 4">
+            <a:extLst>
+              <a:ext uri="{FF2B5EF4-FFF2-40B4-BE49-F238E27FC236}">
+                <a16:creationId xmlns:a16="http://schemas.microsoft.com/office/drawing/2014/main" id="{431D1FCB-20A0-FA4D-B431-C1F4EF12E216}"/>
+              </a:ext>
+            </a:extLst>
+          </p:cNvPr>
           <p:cNvPicPr>
             <a:picLocks noChangeAspect="1"/>
           </p:cNvPicPr>
           <p:nvPr/>
         </p:nvPicPr>
         <p:blipFill>
-          <a:blip r:embed="rId2"/>
+          <a:blip r:embed="rId2">
+            <a:extLst>
+              <a:ext uri="{28A0092B-C50C-407E-A947-70E740481C1C}">
+                <a14:useLocalDpi xmlns:a14="http://schemas.microsoft.com/office/drawing/2010/main" val="0"/>
+              </a:ext>
+            </a:extLst>
+          </a:blip>
           <a:stretch>
             <a:fillRect/>
           </a:stretch>
         </p:blipFill>
         <p:spPr>
           <a:xfrm>
-            <a:off x="6972300" y="3289300"/>
-            <a:ext cx="10439400" cy="7137400"/>
+            <a:off x="4729864" y="3232150"/>
+            <a:ext cx="14924272" cy="9489710"/>
           </a:xfrm>
           <a:prstGeom prst="rect">
             <a:avLst/>
           </a:prstGeom>
-          <a:ln w="12700">
-            <a:miter lim="400000"/>
-          </a:ln>
         </p:spPr>
       </p:pic>
     </p:spTree>
@@ -4288,29 +4326,38 @@
       </p:sp>
       <p:pic>
         <p:nvPicPr>
-          <p:cNvPr id="138" name="Cloud Native-ECS VPC AZs subnets (1).png" descr="Cloud Native-ECS VPC AZs subnets (1).png"/>
+          <p:cNvPr id="7" name="Picture 6">
+            <a:extLst>
+              <a:ext uri="{FF2B5EF4-FFF2-40B4-BE49-F238E27FC236}">
+                <a16:creationId xmlns:a16="http://schemas.microsoft.com/office/drawing/2014/main" id="{E6C924E3-0391-CE40-9D18-64C7078B8336}"/>
+              </a:ext>
+            </a:extLst>
+          </p:cNvPr>
           <p:cNvPicPr>
             <a:picLocks noChangeAspect="1"/>
           </p:cNvPicPr>
           <p:nvPr/>
         </p:nvPicPr>
         <p:blipFill>
-          <a:blip r:embed="rId2"/>
+          <a:blip r:embed="rId2">
+            <a:extLst>
+              <a:ext uri="{28A0092B-C50C-407E-A947-70E740481C1C}">
+                <a14:useLocalDpi xmlns:a14="http://schemas.microsoft.com/office/drawing/2010/main" val="0"/>
+              </a:ext>
+            </a:extLst>
+          </a:blip>
           <a:stretch>
             <a:fillRect/>
           </a:stretch>
         </p:blipFill>
         <p:spPr>
           <a:xfrm>
-            <a:off x="8391463" y="3155039"/>
-            <a:ext cx="7601075" cy="9285522"/>
+            <a:off x="7851627" y="2641600"/>
+            <a:ext cx="8680745" cy="10124862"/>
           </a:xfrm>
           <a:prstGeom prst="rect">
             <a:avLst/>
           </a:prstGeom>
-          <a:ln w="12700">
-            <a:miter lim="400000"/>
-          </a:ln>
         </p:spPr>
       </p:pic>
     </p:spTree>

</xml_diff>